<commit_message>
Svg generated for custom shapes tests are work in progress.
</commit_message>
<xml_diff>
--- a/test/ShapeCrawler.Tests.Unit.xUnit/Resource/autoshape/autoshape-case019_custom-shapes.pptx
+++ b/test/ShapeCrawler.Tests.Unit.xUnit/Resource/autoshape/autoshape-case019_custom-shapes.pptx
@@ -5,11 +5,12 @@
     <p:sldMasterId id="2147483648" r:id="rId1"/>
   </p:sldMasterIdLst>
   <p:notesMasterIdLst>
-    <p:notesMasterId r:id="rId4"/>
+    <p:notesMasterId r:id="rId5"/>
   </p:notesMasterIdLst>
   <p:sldIdLst>
     <p:sldId id="256" r:id="rId2"/>
     <p:sldId id="257" r:id="rId3"/>
+    <p:sldId id="258" r:id="rId4"/>
   </p:sldIdLst>
   <p:sldSz cx="9144000" cy="5143500" type="screen16x9"/>
   <p:notesSz cx="7772400" cy="10058400"/>
@@ -1227,8 +1228,218 @@
 </p:sldLayout>
 </file>
 
+<file path=ppt/slideLayouts/slideLayout14.xml><?xml version="1.0" encoding="utf-8"?>
+<p:sldLayout xmlns:a="http://schemas.openxmlformats.org/drawingml/2006/main" xmlns:r="http://schemas.openxmlformats.org/officeDocument/2006/relationships" xmlns:p="http://schemas.openxmlformats.org/presentationml/2006/main" preserve="1" userDrawn="1">
+  <p:cSld name="1_Custom Layout">
+    <p:spTree>
+      <p:nvGrpSpPr>
+        <p:cNvPr id="1" name=""/>
+        <p:cNvGrpSpPr/>
+        <p:nvPr/>
+      </p:nvGrpSpPr>
+      <p:grpSpPr>
+        <a:xfrm>
+          <a:off x="0" y="0"/>
+          <a:ext cx="0" cy="0"/>
+          <a:chOff x="0" y="0"/>
+          <a:chExt cx="0" cy="0"/>
+        </a:xfrm>
+      </p:grpSpPr>
+      <p:sp>
+        <p:nvSpPr>
+          <p:cNvPr id="3" name="Picture Placeholder 1817">
+            <a:extLst>
+              <a:ext uri="{FF2B5EF4-FFF2-40B4-BE49-F238E27FC236}">
+                <a16:creationId xmlns:a16="http://schemas.microsoft.com/office/drawing/2014/main" id="{C9B0DB0F-5E62-6EEB-C91A-21079E4EB45A}"/>
+              </a:ext>
+            </a:extLst>
+          </p:cNvPr>
+          <p:cNvSpPr>
+            <a:spLocks noGrp="1"/>
+          </p:cNvSpPr>
+          <p:nvPr>
+            <p:ph type="pic" sz="quarter" idx="10"/>
+          </p:nvPr>
+        </p:nvSpPr>
+        <p:spPr>
+          <a:xfrm>
+            <a:off x="1732687" y="351188"/>
+            <a:ext cx="5193348" cy="4517674"/>
+          </a:xfrm>
+          <a:custGeom>
+            <a:avLst/>
+            <a:gdLst>
+              <a:gd name="connsiteX0" fmla="*/ 4338405 w 5193348"/>
+              <a:gd name="connsiteY0" fmla="*/ 945705 h 4517674"/>
+              <a:gd name="connsiteX1" fmla="*/ 5193348 w 5193348"/>
+              <a:gd name="connsiteY1" fmla="*/ 2277018 h 4517674"/>
+              <a:gd name="connsiteX2" fmla="*/ 2986590 w 5193348"/>
+              <a:gd name="connsiteY2" fmla="*/ 4517674 h 4517674"/>
+              <a:gd name="connsiteX3" fmla="*/ 0 w 5193348"/>
+              <a:gd name="connsiteY3" fmla="*/ 2277018 h 4517674"/>
+              <a:gd name="connsiteX4" fmla="*/ 3173252 w 5193348"/>
+              <a:gd name="connsiteY4" fmla="*/ 1293619 h 4517674"/>
+              <a:gd name="connsiteX5" fmla="*/ 4338405 w 5193348"/>
+              <a:gd name="connsiteY5" fmla="*/ 945705 h 4517674"/>
+              <a:gd name="connsiteX6" fmla="*/ 3895248 w 5193348"/>
+              <a:gd name="connsiteY6" fmla="*/ 977 h 4517674"/>
+              <a:gd name="connsiteX7" fmla="*/ 4028175 w 5193348"/>
+              <a:gd name="connsiteY7" fmla="*/ 57455 h 4517674"/>
+              <a:gd name="connsiteX8" fmla="*/ 4131779 w 5193348"/>
+              <a:gd name="connsiteY8" fmla="*/ 675005 h 4517674"/>
+              <a:gd name="connsiteX9" fmla="*/ 3315377 w 5193348"/>
+              <a:gd name="connsiteY9" fmla="*/ 815922 h 4517674"/>
+              <a:gd name="connsiteX10" fmla="*/ 3443846 w 5193348"/>
+              <a:gd name="connsiteY10" fmla="*/ 223240 h 4517674"/>
+              <a:gd name="connsiteX11" fmla="*/ 3841105 w 5193348"/>
+              <a:gd name="connsiteY11" fmla="*/ 1357 h 4517674"/>
+              <a:gd name="connsiteX12" fmla="*/ 3895248 w 5193348"/>
+              <a:gd name="connsiteY12" fmla="*/ 977 h 4517674"/>
+            </a:gdLst>
+            <a:ahLst/>
+            <a:cxnLst>
+              <a:cxn ang="0">
+                <a:pos x="connsiteX0" y="connsiteY0"/>
+              </a:cxn>
+              <a:cxn ang="0">
+                <a:pos x="connsiteX1" y="connsiteY1"/>
+              </a:cxn>
+              <a:cxn ang="0">
+                <a:pos x="connsiteX2" y="connsiteY2"/>
+              </a:cxn>
+              <a:cxn ang="0">
+                <a:pos x="connsiteX3" y="connsiteY3"/>
+              </a:cxn>
+              <a:cxn ang="0">
+                <a:pos x="connsiteX4" y="connsiteY4"/>
+              </a:cxn>
+              <a:cxn ang="0">
+                <a:pos x="connsiteX5" y="connsiteY5"/>
+              </a:cxn>
+              <a:cxn ang="0">
+                <a:pos x="connsiteX6" y="connsiteY6"/>
+              </a:cxn>
+              <a:cxn ang="0">
+                <a:pos x="connsiteX7" y="connsiteY7"/>
+              </a:cxn>
+              <a:cxn ang="0">
+                <a:pos x="connsiteX8" y="connsiteY8"/>
+              </a:cxn>
+              <a:cxn ang="0">
+                <a:pos x="connsiteX9" y="connsiteY9"/>
+              </a:cxn>
+              <a:cxn ang="0">
+                <a:pos x="connsiteX10" y="connsiteY10"/>
+              </a:cxn>
+              <a:cxn ang="0">
+                <a:pos x="connsiteX11" y="connsiteY11"/>
+              </a:cxn>
+              <a:cxn ang="0">
+                <a:pos x="connsiteX12" y="connsiteY12"/>
+              </a:cxn>
+            </a:cxnLst>
+            <a:rect l="l" t="t" r="r" b="b"/>
+            <a:pathLst>
+              <a:path w="5193348" h="4517674">
+                <a:moveTo>
+                  <a:pt x="4338405" y="945705"/>
+                </a:moveTo>
+                <a:cubicBezTo>
+                  <a:pt x="4981603" y="967813"/>
+                  <a:pt x="5193348" y="1541025"/>
+                  <a:pt x="5193348" y="2277018"/>
+                </a:cubicBezTo>
+                <a:cubicBezTo>
+                  <a:pt x="5193348" y="3347554"/>
+                  <a:pt x="4052637" y="4517674"/>
+                  <a:pt x="2986590" y="4517674"/>
+                </a:cubicBezTo>
+                <a:cubicBezTo>
+                  <a:pt x="1924691" y="4517674"/>
+                  <a:pt x="0" y="3347554"/>
+                  <a:pt x="0" y="2277018"/>
+                </a:cubicBezTo>
+                <a:cubicBezTo>
+                  <a:pt x="0" y="1206483"/>
+                  <a:pt x="2231646" y="1783244"/>
+                  <a:pt x="3173252" y="1293619"/>
+                </a:cubicBezTo>
+                <a:cubicBezTo>
+                  <a:pt x="3664535" y="1039471"/>
+                  <a:pt x="4046042" y="935656"/>
+                  <a:pt x="4338405" y="945705"/>
+                </a:cubicBezTo>
+                <a:close/>
+                <a:moveTo>
+                  <a:pt x="3895248" y="977"/>
+                </a:moveTo>
+                <a:cubicBezTo>
+                  <a:pt x="3947425" y="5255"/>
+                  <a:pt x="3993208" y="23650"/>
+                  <a:pt x="4028175" y="57455"/>
+                </a:cubicBezTo>
+                <a:cubicBezTo>
+                  <a:pt x="4156645" y="173505"/>
+                  <a:pt x="4330700" y="463628"/>
+                  <a:pt x="4131779" y="675005"/>
+                </a:cubicBezTo>
+                <a:cubicBezTo>
+                  <a:pt x="3937003" y="886381"/>
+                  <a:pt x="3439702" y="936116"/>
+                  <a:pt x="3315377" y="815922"/>
+                </a:cubicBezTo>
+                <a:cubicBezTo>
+                  <a:pt x="3186907" y="699872"/>
+                  <a:pt x="3244925" y="434616"/>
+                  <a:pt x="3443846" y="223240"/>
+                </a:cubicBezTo>
+                <a:cubicBezTo>
+                  <a:pt x="3568172" y="91130"/>
+                  <a:pt x="3716779" y="12447"/>
+                  <a:pt x="3841105" y="1357"/>
+                </a:cubicBezTo>
+                <a:cubicBezTo>
+                  <a:pt x="3859754" y="-306"/>
+                  <a:pt x="3877856" y="-449"/>
+                  <a:pt x="3895248" y="977"/>
+                </a:cubicBezTo>
+                <a:close/>
+              </a:path>
+            </a:pathLst>
+          </a:custGeom>
+        </p:spPr>
+        <p:txBody>
+          <a:bodyPr wrap="square">
+            <a:noAutofit/>
+          </a:bodyPr>
+          <a:lstStyle>
+            <a:lvl1pPr marL="0" indent="0">
+              <a:buNone/>
+              <a:defRPr>
+                <a:latin typeface="Open Sans" panose="020B0606030504020204" pitchFamily="34" charset="0"/>
+              </a:defRPr>
+            </a:lvl1pPr>
+          </a:lstStyle>
+          <a:p>
+            <a:endParaRPr lang="en-US" dirty="0"/>
+          </a:p>
+        </p:txBody>
+      </p:sp>
+    </p:spTree>
+    <p:extLst>
+      <p:ext uri="{BB962C8B-B14F-4D97-AF65-F5344CB8AC3E}">
+        <p14:creationId xmlns:p14="http://schemas.microsoft.com/office/powerpoint/2010/main" val="1390240940"/>
+      </p:ext>
+    </p:extLst>
+  </p:cSld>
+  <p:clrMapOvr>
+    <a:masterClrMapping/>
+  </p:clrMapOvr>
+</p:sldLayout>
+</file>
+
 <file path=ppt/slideLayouts/slideLayout2.xml><?xml version="1.0" encoding="utf-8"?>
-<p:sldLayout xmlns:a="http://schemas.openxmlformats.org/drawingml/2006/main" xmlns:r="http://schemas.openxmlformats.org/officeDocument/2006/relationships" xmlns:p="http://schemas.openxmlformats.org/presentationml/2006/main" type="tx" preserve="1">
+<p:sldLayout xmlns:a="http://schemas.openxmlformats.org/drawingml/2006/main" xmlns:r="http://schemas.openxmlformats.org/officeDocument/2006/relationships" xmlns:p="http://schemas.openxmlformats.org/presentationml/2006/main" preserve="1" userDrawn="1">
   <p:cSld name="Title Slide">
     <p:spTree>
       <p:nvGrpSpPr>
@@ -1305,6 +1516,185 @@
             <a:endParaRPr lang="en-US" sz="3200" b="0" strike="noStrike" spc="-1" dirty="0">
               <a:latin typeface="Arial"/>
             </a:endParaRPr>
+          </a:p>
+        </p:txBody>
+      </p:sp>
+      <p:sp>
+        <p:nvSpPr>
+          <p:cNvPr id="4" name="Picture Placeholder 1817">
+            <a:extLst>
+              <a:ext uri="{FF2B5EF4-FFF2-40B4-BE49-F238E27FC236}">
+                <a16:creationId xmlns:a16="http://schemas.microsoft.com/office/drawing/2014/main" id="{37054496-C8D5-6897-A269-4E4FA0A8991B}"/>
+              </a:ext>
+            </a:extLst>
+          </p:cNvPr>
+          <p:cNvSpPr>
+            <a:spLocks noGrp="1"/>
+          </p:cNvSpPr>
+          <p:nvPr>
+            <p:ph type="pic" sz="quarter" idx="10"/>
+          </p:nvPr>
+        </p:nvSpPr>
+        <p:spPr>
+          <a:xfrm>
+            <a:off x="6114187" y="1341493"/>
+            <a:ext cx="5193348" cy="4517674"/>
+          </a:xfrm>
+          <a:custGeom>
+            <a:avLst/>
+            <a:gdLst>
+              <a:gd name="connsiteX0" fmla="*/ 4338405 w 5193348"/>
+              <a:gd name="connsiteY0" fmla="*/ 945705 h 4517674"/>
+              <a:gd name="connsiteX1" fmla="*/ 5193348 w 5193348"/>
+              <a:gd name="connsiteY1" fmla="*/ 2277018 h 4517674"/>
+              <a:gd name="connsiteX2" fmla="*/ 2986590 w 5193348"/>
+              <a:gd name="connsiteY2" fmla="*/ 4517674 h 4517674"/>
+              <a:gd name="connsiteX3" fmla="*/ 0 w 5193348"/>
+              <a:gd name="connsiteY3" fmla="*/ 2277018 h 4517674"/>
+              <a:gd name="connsiteX4" fmla="*/ 3173252 w 5193348"/>
+              <a:gd name="connsiteY4" fmla="*/ 1293619 h 4517674"/>
+              <a:gd name="connsiteX5" fmla="*/ 4338405 w 5193348"/>
+              <a:gd name="connsiteY5" fmla="*/ 945705 h 4517674"/>
+              <a:gd name="connsiteX6" fmla="*/ 3895248 w 5193348"/>
+              <a:gd name="connsiteY6" fmla="*/ 977 h 4517674"/>
+              <a:gd name="connsiteX7" fmla="*/ 4028175 w 5193348"/>
+              <a:gd name="connsiteY7" fmla="*/ 57455 h 4517674"/>
+              <a:gd name="connsiteX8" fmla="*/ 4131779 w 5193348"/>
+              <a:gd name="connsiteY8" fmla="*/ 675005 h 4517674"/>
+              <a:gd name="connsiteX9" fmla="*/ 3315377 w 5193348"/>
+              <a:gd name="connsiteY9" fmla="*/ 815922 h 4517674"/>
+              <a:gd name="connsiteX10" fmla="*/ 3443846 w 5193348"/>
+              <a:gd name="connsiteY10" fmla="*/ 223240 h 4517674"/>
+              <a:gd name="connsiteX11" fmla="*/ 3841105 w 5193348"/>
+              <a:gd name="connsiteY11" fmla="*/ 1357 h 4517674"/>
+              <a:gd name="connsiteX12" fmla="*/ 3895248 w 5193348"/>
+              <a:gd name="connsiteY12" fmla="*/ 977 h 4517674"/>
+            </a:gdLst>
+            <a:ahLst/>
+            <a:cxnLst>
+              <a:cxn ang="0">
+                <a:pos x="connsiteX0" y="connsiteY0"/>
+              </a:cxn>
+              <a:cxn ang="0">
+                <a:pos x="connsiteX1" y="connsiteY1"/>
+              </a:cxn>
+              <a:cxn ang="0">
+                <a:pos x="connsiteX2" y="connsiteY2"/>
+              </a:cxn>
+              <a:cxn ang="0">
+                <a:pos x="connsiteX3" y="connsiteY3"/>
+              </a:cxn>
+              <a:cxn ang="0">
+                <a:pos x="connsiteX4" y="connsiteY4"/>
+              </a:cxn>
+              <a:cxn ang="0">
+                <a:pos x="connsiteX5" y="connsiteY5"/>
+              </a:cxn>
+              <a:cxn ang="0">
+                <a:pos x="connsiteX6" y="connsiteY6"/>
+              </a:cxn>
+              <a:cxn ang="0">
+                <a:pos x="connsiteX7" y="connsiteY7"/>
+              </a:cxn>
+              <a:cxn ang="0">
+                <a:pos x="connsiteX8" y="connsiteY8"/>
+              </a:cxn>
+              <a:cxn ang="0">
+                <a:pos x="connsiteX9" y="connsiteY9"/>
+              </a:cxn>
+              <a:cxn ang="0">
+                <a:pos x="connsiteX10" y="connsiteY10"/>
+              </a:cxn>
+              <a:cxn ang="0">
+                <a:pos x="connsiteX11" y="connsiteY11"/>
+              </a:cxn>
+              <a:cxn ang="0">
+                <a:pos x="connsiteX12" y="connsiteY12"/>
+              </a:cxn>
+            </a:cxnLst>
+            <a:rect l="l" t="t" r="r" b="b"/>
+            <a:pathLst>
+              <a:path w="5193348" h="4517674">
+                <a:moveTo>
+                  <a:pt x="4338405" y="945705"/>
+                </a:moveTo>
+                <a:cubicBezTo>
+                  <a:pt x="4981603" y="967813"/>
+                  <a:pt x="5193348" y="1541025"/>
+                  <a:pt x="5193348" y="2277018"/>
+                </a:cubicBezTo>
+                <a:cubicBezTo>
+                  <a:pt x="5193348" y="3347554"/>
+                  <a:pt x="4052637" y="4517674"/>
+                  <a:pt x="2986590" y="4517674"/>
+                </a:cubicBezTo>
+                <a:cubicBezTo>
+                  <a:pt x="1924691" y="4517674"/>
+                  <a:pt x="0" y="3347554"/>
+                  <a:pt x="0" y="2277018"/>
+                </a:cubicBezTo>
+                <a:cubicBezTo>
+                  <a:pt x="0" y="1206483"/>
+                  <a:pt x="2231646" y="1783244"/>
+                  <a:pt x="3173252" y="1293619"/>
+                </a:cubicBezTo>
+                <a:cubicBezTo>
+                  <a:pt x="3664535" y="1039471"/>
+                  <a:pt x="4046042" y="935656"/>
+                  <a:pt x="4338405" y="945705"/>
+                </a:cubicBezTo>
+                <a:close/>
+                <a:moveTo>
+                  <a:pt x="3895248" y="977"/>
+                </a:moveTo>
+                <a:cubicBezTo>
+                  <a:pt x="3947425" y="5255"/>
+                  <a:pt x="3993208" y="23650"/>
+                  <a:pt x="4028175" y="57455"/>
+                </a:cubicBezTo>
+                <a:cubicBezTo>
+                  <a:pt x="4156645" y="173505"/>
+                  <a:pt x="4330700" y="463628"/>
+                  <a:pt x="4131779" y="675005"/>
+                </a:cubicBezTo>
+                <a:cubicBezTo>
+                  <a:pt x="3937003" y="886381"/>
+                  <a:pt x="3439702" y="936116"/>
+                  <a:pt x="3315377" y="815922"/>
+                </a:cubicBezTo>
+                <a:cubicBezTo>
+                  <a:pt x="3186907" y="699872"/>
+                  <a:pt x="3244925" y="434616"/>
+                  <a:pt x="3443846" y="223240"/>
+                </a:cubicBezTo>
+                <a:cubicBezTo>
+                  <a:pt x="3568172" y="91130"/>
+                  <a:pt x="3716779" y="12447"/>
+                  <a:pt x="3841105" y="1357"/>
+                </a:cubicBezTo>
+                <a:cubicBezTo>
+                  <a:pt x="3859754" y="-306"/>
+                  <a:pt x="3877856" y="-449"/>
+                  <a:pt x="3895248" y="977"/>
+                </a:cubicBezTo>
+                <a:close/>
+              </a:path>
+            </a:pathLst>
+          </a:custGeom>
+        </p:spPr>
+        <p:txBody>
+          <a:bodyPr wrap="square">
+            <a:noAutofit/>
+          </a:bodyPr>
+          <a:lstStyle>
+            <a:lvl1pPr>
+              <a:defRPr>
+                <a:latin typeface="Open Sans" panose="020B0606030504020204" pitchFamily="34" charset="0"/>
+              </a:defRPr>
+            </a:lvl1pPr>
+          </a:lstStyle>
+          <a:p>
+            <a:endParaRPr lang="en-US"/>
           </a:p>
         </p:txBody>
       </p:sp>
@@ -2169,6 +2559,7 @@
     <p:sldLayoutId id="2147483659" r:id="rId11"/>
     <p:sldLayoutId id="2147483660" r:id="rId12"/>
     <p:sldLayoutId id="2147483661" r:id="rId13"/>
+    <p:sldLayoutId id="2147483662" r:id="rId14"/>
   </p:sldLayoutIdLst>
   <p:txStyles>
     <p:titleStyle>
@@ -4137,280 +4528,529 @@
           <a:chExt cx="0" cy="0"/>
         </a:xfrm>
       </p:grpSpPr>
-      <p:sp>
-        <p:nvSpPr>
-          <p:cNvPr id="4" name="TopRightCorner">
+      <p:grpSp>
+        <p:nvGrpSpPr>
+          <p:cNvPr id="5" name="Group 4">
             <a:extLst>
               <a:ext uri="{FF2B5EF4-FFF2-40B4-BE49-F238E27FC236}">
-                <a16:creationId xmlns:a16="http://schemas.microsoft.com/office/drawing/2014/main" id="{B8E38629-CD91-BA4C-9417-D999E51353FE}"/>
+                <a16:creationId xmlns:a16="http://schemas.microsoft.com/office/drawing/2014/main" id="{B7D1F3AA-B5D5-8860-90C1-31E943D7E8BF}"/>
               </a:ext>
             </a:extLst>
           </p:cNvPr>
-          <p:cNvSpPr>
-            <a:spLocks/>
-          </p:cNvSpPr>
+          <p:cNvGrpSpPr/>
           <p:nvPr/>
-        </p:nvSpPr>
-        <p:spPr bwMode="auto">
+        </p:nvGrpSpPr>
+        <p:grpSpPr>
           <a:xfrm>
-            <a:off x="155833" y="263607"/>
-            <a:ext cx="3130225" cy="4094207"/>
-          </a:xfrm>
-          <a:custGeom>
-            <a:avLst/>
-            <a:gdLst>
-              <a:gd name="T0" fmla="*/ 0 w 2002"/>
-              <a:gd name="T1" fmla="*/ 0 h 1255"/>
-              <a:gd name="T2" fmla="*/ 29 w 2002"/>
-              <a:gd name="T3" fmla="*/ 154 h 1255"/>
-              <a:gd name="T4" fmla="*/ 411 w 2002"/>
-              <a:gd name="T5" fmla="*/ 490 h 1255"/>
-              <a:gd name="T6" fmla="*/ 1081 w 2002"/>
-              <a:gd name="T7" fmla="*/ 495 h 1255"/>
-              <a:gd name="T8" fmla="*/ 1452 w 2002"/>
-              <a:gd name="T9" fmla="*/ 775 h 1255"/>
-              <a:gd name="T10" fmla="*/ 1632 w 2002"/>
-              <a:gd name="T11" fmla="*/ 1045 h 1255"/>
-              <a:gd name="T12" fmla="*/ 2002 w 2002"/>
-              <a:gd name="T13" fmla="*/ 1255 h 1255"/>
-              <a:gd name="T14" fmla="*/ 2002 w 2002"/>
-              <a:gd name="T15" fmla="*/ 0 h 1255"/>
-              <a:gd name="T16" fmla="*/ 0 w 2002"/>
-              <a:gd name="T17" fmla="*/ 0 h 1255"/>
-            </a:gdLst>
-            <a:ahLst/>
-            <a:cxnLst>
-              <a:cxn ang="0">
-                <a:pos x="T0" y="T1"/>
-              </a:cxn>
-              <a:cxn ang="0">
-                <a:pos x="T2" y="T3"/>
-              </a:cxn>
-              <a:cxn ang="0">
-                <a:pos x="T4" y="T5"/>
-              </a:cxn>
-              <a:cxn ang="0">
-                <a:pos x="T6" y="T7"/>
-              </a:cxn>
-              <a:cxn ang="0">
-                <a:pos x="T8" y="T9"/>
-              </a:cxn>
-              <a:cxn ang="0">
-                <a:pos x="T10" y="T11"/>
-              </a:cxn>
-              <a:cxn ang="0">
-                <a:pos x="T12" y="T13"/>
-              </a:cxn>
-              <a:cxn ang="0">
-                <a:pos x="T14" y="T15"/>
-              </a:cxn>
-              <a:cxn ang="0">
-                <a:pos x="T16" y="T17"/>
-              </a:cxn>
-            </a:cxnLst>
-            <a:rect l="0" t="0" r="r" b="b"/>
-            <a:pathLst>
-              <a:path w="2002" h="1255">
-                <a:moveTo>
-                  <a:pt x="0" y="0"/>
-                </a:moveTo>
-                <a:cubicBezTo>
-                  <a:pt x="2" y="52"/>
-                  <a:pt x="11" y="104"/>
-                  <a:pt x="29" y="154"/>
-                </a:cubicBezTo>
-                <a:cubicBezTo>
-                  <a:pt x="88" y="321"/>
-                  <a:pt x="238" y="453"/>
-                  <a:pt x="411" y="490"/>
-                </a:cubicBezTo>
-                <a:cubicBezTo>
-                  <a:pt x="631" y="538"/>
-                  <a:pt x="864" y="441"/>
-                  <a:pt x="1081" y="495"/>
-                </a:cubicBezTo>
-                <a:cubicBezTo>
-                  <a:pt x="1235" y="534"/>
-                  <a:pt x="1363" y="645"/>
-                  <a:pt x="1452" y="775"/>
-                </a:cubicBezTo>
-                <a:cubicBezTo>
-                  <a:pt x="1514" y="865"/>
-                  <a:pt x="1560" y="965"/>
-                  <a:pt x="1632" y="1045"/>
-                </a:cubicBezTo>
-                <a:cubicBezTo>
-                  <a:pt x="1729" y="1154"/>
-                  <a:pt x="1860" y="1218"/>
-                  <a:pt x="2002" y="1255"/>
-                </a:cubicBezTo>
-                <a:cubicBezTo>
-                  <a:pt x="2002" y="0"/>
-                  <a:pt x="2002" y="0"/>
-                  <a:pt x="2002" y="0"/>
-                </a:cubicBezTo>
-                <a:lnTo>
-                  <a:pt x="0" y="0"/>
-                </a:lnTo>
-                <a:close/>
+            <a:off x="155833" y="103414"/>
+            <a:ext cx="8289667" cy="4254400"/>
+            <a:chOff x="155833" y="103414"/>
+            <a:chExt cx="8289667" cy="4254400"/>
+          </a:xfrm>
+        </p:grpSpPr>
+        <p:sp>
+          <p:nvSpPr>
+            <p:cNvPr id="4" name="TopRightCorner">
+              <a:extLst>
+                <a:ext uri="{FF2B5EF4-FFF2-40B4-BE49-F238E27FC236}">
+                  <a16:creationId xmlns:a16="http://schemas.microsoft.com/office/drawing/2014/main" id="{B8E38629-CD91-BA4C-9417-D999E51353FE}"/>
+                </a:ext>
+              </a:extLst>
+            </p:cNvPr>
+            <p:cNvSpPr>
+              <a:spLocks/>
+            </p:cNvSpPr>
+            <p:nvPr/>
+          </p:nvSpPr>
+          <p:spPr bwMode="auto">
+            <a:xfrm>
+              <a:off x="155833" y="263607"/>
+              <a:ext cx="3130225" cy="4094207"/>
+            </a:xfrm>
+            <a:custGeom>
+              <a:avLst/>
+              <a:gdLst>
+                <a:gd name="T0" fmla="*/ 0 w 2002"/>
+                <a:gd name="T1" fmla="*/ 0 h 1255"/>
+                <a:gd name="T2" fmla="*/ 29 w 2002"/>
+                <a:gd name="T3" fmla="*/ 154 h 1255"/>
+                <a:gd name="T4" fmla="*/ 411 w 2002"/>
+                <a:gd name="T5" fmla="*/ 490 h 1255"/>
+                <a:gd name="T6" fmla="*/ 1081 w 2002"/>
+                <a:gd name="T7" fmla="*/ 495 h 1255"/>
+                <a:gd name="T8" fmla="*/ 1452 w 2002"/>
+                <a:gd name="T9" fmla="*/ 775 h 1255"/>
+                <a:gd name="T10" fmla="*/ 1632 w 2002"/>
+                <a:gd name="T11" fmla="*/ 1045 h 1255"/>
+                <a:gd name="T12" fmla="*/ 2002 w 2002"/>
+                <a:gd name="T13" fmla="*/ 1255 h 1255"/>
+                <a:gd name="T14" fmla="*/ 2002 w 2002"/>
+                <a:gd name="T15" fmla="*/ 0 h 1255"/>
+                <a:gd name="T16" fmla="*/ 0 w 2002"/>
+                <a:gd name="T17" fmla="*/ 0 h 1255"/>
+              </a:gdLst>
+              <a:ahLst/>
+              <a:cxnLst>
+                <a:cxn ang="0">
+                  <a:pos x="T0" y="T1"/>
+                </a:cxn>
+                <a:cxn ang="0">
+                  <a:pos x="T2" y="T3"/>
+                </a:cxn>
+                <a:cxn ang="0">
+                  <a:pos x="T4" y="T5"/>
+                </a:cxn>
+                <a:cxn ang="0">
+                  <a:pos x="T6" y="T7"/>
+                </a:cxn>
+                <a:cxn ang="0">
+                  <a:pos x="T8" y="T9"/>
+                </a:cxn>
+                <a:cxn ang="0">
+                  <a:pos x="T10" y="T11"/>
+                </a:cxn>
+                <a:cxn ang="0">
+                  <a:pos x="T12" y="T13"/>
+                </a:cxn>
+                <a:cxn ang="0">
+                  <a:pos x="T14" y="T15"/>
+                </a:cxn>
+                <a:cxn ang="0">
+                  <a:pos x="T16" y="T17"/>
+                </a:cxn>
+              </a:cxnLst>
+              <a:rect l="0" t="0" r="r" b="b"/>
+              <a:pathLst>
+                <a:path w="2002" h="1255">
+                  <a:moveTo>
+                    <a:pt x="0" y="0"/>
+                  </a:moveTo>
+                  <a:cubicBezTo>
+                    <a:pt x="2" y="52"/>
+                    <a:pt x="11" y="104"/>
+                    <a:pt x="29" y="154"/>
+                  </a:cubicBezTo>
+                  <a:cubicBezTo>
+                    <a:pt x="88" y="321"/>
+                    <a:pt x="238" y="453"/>
+                    <a:pt x="411" y="490"/>
+                  </a:cubicBezTo>
+                  <a:cubicBezTo>
+                    <a:pt x="631" y="538"/>
+                    <a:pt x="864" y="441"/>
+                    <a:pt x="1081" y="495"/>
+                  </a:cubicBezTo>
+                  <a:cubicBezTo>
+                    <a:pt x="1235" y="534"/>
+                    <a:pt x="1363" y="645"/>
+                    <a:pt x="1452" y="775"/>
+                  </a:cubicBezTo>
+                  <a:cubicBezTo>
+                    <a:pt x="1514" y="865"/>
+                    <a:pt x="1560" y="965"/>
+                    <a:pt x="1632" y="1045"/>
+                  </a:cubicBezTo>
+                  <a:cubicBezTo>
+                    <a:pt x="1729" y="1154"/>
+                    <a:pt x="1860" y="1218"/>
+                    <a:pt x="2002" y="1255"/>
+                  </a:cubicBezTo>
+                  <a:cubicBezTo>
+                    <a:pt x="2002" y="0"/>
+                    <a:pt x="2002" y="0"/>
+                    <a:pt x="2002" y="0"/>
+                  </a:cubicBezTo>
+                  <a:lnTo>
+                    <a:pt x="0" y="0"/>
+                  </a:lnTo>
+                  <a:close/>
+                </a:path>
+              </a:pathLst>
+            </a:custGeom>
+            <a:gradFill flip="none" rotWithShape="1">
+              <a:gsLst>
+                <a:gs pos="100000">
+                  <a:schemeClr val="accent6"/>
+                </a:gs>
+                <a:gs pos="0">
+                  <a:srgbClr val="002060">
+                    <a:alpha val="0"/>
+                  </a:srgbClr>
+                </a:gs>
+              </a:gsLst>
+              <a:lin ang="3900000" scaled="0"/>
+              <a:tileRect/>
+            </a:gradFill>
+            <a:ln>
+              <a:noFill/>
+            </a:ln>
+          </p:spPr>
+          <p:txBody>
+            <a:bodyPr vert="horz" wrap="square" lIns="91440" tIns="45720" rIns="91440" bIns="45720" numCol="1" anchor="t" anchorCtr="0" compatLnSpc="1">
+              <a:prstTxWarp prst="textNoShape">
+                <a:avLst/>
+              </a:prstTxWarp>
+            </a:bodyPr>
+            <a:lstStyle/>
+            <a:p>
+              <a:r>
+                <a:rPr lang="en-US" dirty="0">
+                  <a:latin typeface="Open Sans" panose="020B0606030504020204" pitchFamily="34" charset="0"/>
+                </a:rPr>
+                <a:t>    </a:t>
+              </a:r>
+            </a:p>
+          </p:txBody>
+        </p:sp>
+        <p:sp>
+          <p:nvSpPr>
+            <p:cNvPr id="2" name="Oval">
+              <a:extLst>
+                <a:ext uri="{FF2B5EF4-FFF2-40B4-BE49-F238E27FC236}">
+                  <a16:creationId xmlns:a16="http://schemas.microsoft.com/office/drawing/2014/main" id="{00AC98E5-829D-694E-8DC4-D4E4F877F4A4}"/>
+                </a:ext>
+              </a:extLst>
+            </p:cNvPr>
+            <p:cNvSpPr>
+              <a:spLocks/>
+            </p:cNvSpPr>
+            <p:nvPr/>
+          </p:nvSpPr>
+          <p:spPr bwMode="auto">
+            <a:xfrm>
+              <a:off x="4428558" y="928914"/>
+              <a:ext cx="2581842" cy="3428900"/>
+            </a:xfrm>
+            <a:custGeom>
+              <a:avLst/>
+              <a:gdLst>
+                <a:gd name="T0" fmla="*/ 23 w 896"/>
+                <a:gd name="T1" fmla="*/ 479 h 1109"/>
+                <a:gd name="T2" fmla="*/ 631 w 896"/>
+                <a:gd name="T3" fmla="*/ 1086 h 1109"/>
+                <a:gd name="T4" fmla="*/ 873 w 896"/>
+                <a:gd name="T5" fmla="*/ 393 h 1109"/>
+                <a:gd name="T6" fmla="*/ 407 w 896"/>
+                <a:gd name="T7" fmla="*/ 23 h 1109"/>
+                <a:gd name="T8" fmla="*/ 23 w 896"/>
+                <a:gd name="T9" fmla="*/ 479 h 1109"/>
+              </a:gdLst>
+              <a:ahLst/>
+              <a:cxnLst>
+                <a:cxn ang="0">
+                  <a:pos x="T0" y="T1"/>
+                </a:cxn>
+                <a:cxn ang="0">
+                  <a:pos x="T2" y="T3"/>
+                </a:cxn>
+                <a:cxn ang="0">
+                  <a:pos x="T4" y="T5"/>
+                </a:cxn>
+                <a:cxn ang="0">
+                  <a:pos x="T6" y="T7"/>
+                </a:cxn>
+                <a:cxn ang="0">
+                  <a:pos x="T8" y="T9"/>
+                </a:cxn>
+              </a:cxnLst>
+              <a:rect l="0" t="0" r="r" b="b"/>
+              <a:pathLst>
+                <a:path w="896" h="1109">
+                  <a:moveTo>
+                    <a:pt x="23" y="479"/>
+                  </a:moveTo>
+                  <a:cubicBezTo>
+                    <a:pt x="46" y="707"/>
+                    <a:pt x="396" y="1109"/>
+                    <a:pt x="631" y="1086"/>
+                  </a:cubicBezTo>
+                  <a:cubicBezTo>
+                    <a:pt x="865" y="1062"/>
+                    <a:pt x="896" y="621"/>
+                    <a:pt x="873" y="393"/>
+                  </a:cubicBezTo>
+                  <a:cubicBezTo>
+                    <a:pt x="850" y="165"/>
+                    <a:pt x="641" y="0"/>
+                    <a:pt x="407" y="23"/>
+                  </a:cubicBezTo>
+                  <a:cubicBezTo>
+                    <a:pt x="172" y="47"/>
+                    <a:pt x="0" y="251"/>
+                    <a:pt x="23" y="479"/>
+                  </a:cubicBezTo>
+                  <a:close/>
+                </a:path>
+              </a:pathLst>
+            </a:custGeom>
+            <a:gradFill flip="none" rotWithShape="1">
+              <a:gsLst>
+                <a:gs pos="100000">
+                  <a:srgbClr val="7030A0">
+                    <a:alpha val="90000"/>
+                    <a:lumMod val="100000"/>
+                  </a:srgbClr>
+                </a:gs>
+                <a:gs pos="0">
+                  <a:srgbClr val="002060"/>
+                </a:gs>
+              </a:gsLst>
+              <a:path path="rect">
+                <a:fillToRect t="100000" r="100000"/>
               </a:path>
-            </a:pathLst>
-          </a:custGeom>
-          <a:gradFill flip="none" rotWithShape="1">
-            <a:gsLst>
-              <a:gs pos="100000">
-                <a:schemeClr val="accent6"/>
-              </a:gs>
-              <a:gs pos="0">
-                <a:srgbClr val="002060">
-                  <a:alpha val="0"/>
-                </a:srgbClr>
-              </a:gs>
-            </a:gsLst>
-            <a:lin ang="3900000" scaled="0"/>
-            <a:tileRect/>
-          </a:gradFill>
-          <a:ln>
-            <a:noFill/>
-          </a:ln>
-        </p:spPr>
-        <p:txBody>
-          <a:bodyPr vert="horz" wrap="square" lIns="91440" tIns="45720" rIns="91440" bIns="45720" numCol="1" anchor="t" anchorCtr="0" compatLnSpc="1">
-            <a:prstTxWarp prst="textNoShape">
+              <a:tileRect l="-100000" b="-100000"/>
+            </a:gradFill>
+            <a:ln>
+              <a:noFill/>
+            </a:ln>
+          </p:spPr>
+          <p:txBody>
+            <a:bodyPr vert="horz" wrap="square" lIns="91440" tIns="45720" rIns="91440" bIns="45720" numCol="1" anchor="t" anchorCtr="0" compatLnSpc="1">
+              <a:prstTxWarp prst="textNoShape">
+                <a:avLst/>
+              </a:prstTxWarp>
+            </a:bodyPr>
+            <a:lstStyle/>
+            <a:p>
+              <a:endParaRPr lang="en-US">
+                <a:latin typeface="Open Sans" panose="020B0606030504020204" pitchFamily="34" charset="0"/>
+              </a:endParaRPr>
+            </a:p>
+          </p:txBody>
+        </p:sp>
+        <p:sp>
+          <p:nvSpPr>
+            <p:cNvPr id="3" name="Oval">
+              <a:extLst>
+                <a:ext uri="{FF2B5EF4-FFF2-40B4-BE49-F238E27FC236}">
+                  <a16:creationId xmlns:a16="http://schemas.microsoft.com/office/drawing/2014/main" id="{03DC8558-7F77-B9CD-A2EF-4597E8225730}"/>
+                </a:ext>
+              </a:extLst>
+            </p:cNvPr>
+            <p:cNvSpPr>
+              <a:spLocks/>
+            </p:cNvSpPr>
+            <p:nvPr/>
+          </p:nvSpPr>
+          <p:spPr bwMode="auto">
+            <a:xfrm>
+              <a:off x="7353300" y="103414"/>
+              <a:ext cx="1092200" cy="2055586"/>
+            </a:xfrm>
+            <a:custGeom>
               <a:avLst/>
-            </a:prstTxWarp>
-          </a:bodyPr>
-          <a:lstStyle/>
-          <a:p>
-            <a:r>
-              <a:rPr lang="en-US" dirty="0">
+              <a:gdLst>
+                <a:gd name="T0" fmla="*/ 23 w 896"/>
+                <a:gd name="T1" fmla="*/ 479 h 1109"/>
+                <a:gd name="T2" fmla="*/ 631 w 896"/>
+                <a:gd name="T3" fmla="*/ 1086 h 1109"/>
+                <a:gd name="T4" fmla="*/ 873 w 896"/>
+                <a:gd name="T5" fmla="*/ 393 h 1109"/>
+                <a:gd name="T6" fmla="*/ 407 w 896"/>
+                <a:gd name="T7" fmla="*/ 23 h 1109"/>
+                <a:gd name="T8" fmla="*/ 23 w 896"/>
+                <a:gd name="T9" fmla="*/ 479 h 1109"/>
+              </a:gdLst>
+              <a:ahLst/>
+              <a:cxnLst>
+                <a:cxn ang="0">
+                  <a:pos x="T0" y="T1"/>
+                </a:cxn>
+                <a:cxn ang="0">
+                  <a:pos x="T2" y="T3"/>
+                </a:cxn>
+                <a:cxn ang="0">
+                  <a:pos x="T4" y="T5"/>
+                </a:cxn>
+                <a:cxn ang="0">
+                  <a:pos x="T6" y="T7"/>
+                </a:cxn>
+                <a:cxn ang="0">
+                  <a:pos x="T8" y="T9"/>
+                </a:cxn>
+              </a:cxnLst>
+              <a:rect l="0" t="0" r="r" b="b"/>
+              <a:pathLst>
+                <a:path w="896" h="1109">
+                  <a:moveTo>
+                    <a:pt x="23" y="479"/>
+                  </a:moveTo>
+                  <a:cubicBezTo>
+                    <a:pt x="46" y="707"/>
+                    <a:pt x="396" y="1109"/>
+                    <a:pt x="631" y="1086"/>
+                  </a:cubicBezTo>
+                  <a:cubicBezTo>
+                    <a:pt x="865" y="1062"/>
+                    <a:pt x="896" y="621"/>
+                    <a:pt x="873" y="393"/>
+                  </a:cubicBezTo>
+                  <a:cubicBezTo>
+                    <a:pt x="850" y="165"/>
+                    <a:pt x="641" y="0"/>
+                    <a:pt x="407" y="23"/>
+                  </a:cubicBezTo>
+                  <a:cubicBezTo>
+                    <a:pt x="172" y="47"/>
+                    <a:pt x="0" y="251"/>
+                    <a:pt x="23" y="479"/>
+                  </a:cubicBezTo>
+                  <a:close/>
+                </a:path>
+              </a:pathLst>
+            </a:custGeom>
+            <a:gradFill flip="none" rotWithShape="1">
+              <a:gsLst>
+                <a:gs pos="100000">
+                  <a:srgbClr val="7030A0">
+                    <a:alpha val="90000"/>
+                    <a:lumMod val="100000"/>
+                  </a:srgbClr>
+                </a:gs>
+                <a:gs pos="0">
+                  <a:srgbClr val="002060"/>
+                </a:gs>
+              </a:gsLst>
+              <a:path path="rect">
+                <a:fillToRect t="100000" r="100000"/>
+              </a:path>
+              <a:tileRect l="-100000" b="-100000"/>
+            </a:gradFill>
+            <a:ln w="127000">
+              <a:solidFill>
+                <a:schemeClr val="bg1">
+                  <a:lumMod val="75000"/>
+                </a:schemeClr>
+              </a:solidFill>
+            </a:ln>
+          </p:spPr>
+          <p:txBody>
+            <a:bodyPr vert="horz" wrap="square" lIns="91440" tIns="45720" rIns="91440" bIns="45720" numCol="1" anchor="t" anchorCtr="0" compatLnSpc="1">
+              <a:prstTxWarp prst="textNoShape">
+                <a:avLst/>
+              </a:prstTxWarp>
+            </a:bodyPr>
+            <a:lstStyle/>
+            <a:p>
+              <a:endParaRPr lang="en-US">
                 <a:latin typeface="Open Sans" panose="020B0606030504020204" pitchFamily="34" charset="0"/>
-              </a:rPr>
-              <a:t>    </a:t>
-            </a:r>
-          </a:p>
-        </p:txBody>
-      </p:sp>
-      <p:sp>
-        <p:nvSpPr>
-          <p:cNvPr id="2" name="Oval">
-            <a:extLst>
-              <a:ext uri="{FF2B5EF4-FFF2-40B4-BE49-F238E27FC236}">
-                <a16:creationId xmlns:a16="http://schemas.microsoft.com/office/drawing/2014/main" id="{00AC98E5-829D-694E-8DC4-D4E4F877F4A4}"/>
-              </a:ext>
-            </a:extLst>
-          </p:cNvPr>
-          <p:cNvSpPr>
-            <a:spLocks/>
-          </p:cNvSpPr>
-          <p:nvPr/>
-        </p:nvSpPr>
-        <p:spPr bwMode="auto">
-          <a:xfrm>
-            <a:off x="4428558" y="928914"/>
-            <a:ext cx="2581842" cy="3428900"/>
-          </a:xfrm>
-          <a:custGeom>
-            <a:avLst/>
-            <a:gdLst>
-              <a:gd name="T0" fmla="*/ 23 w 896"/>
-              <a:gd name="T1" fmla="*/ 479 h 1109"/>
-              <a:gd name="T2" fmla="*/ 631 w 896"/>
-              <a:gd name="T3" fmla="*/ 1086 h 1109"/>
-              <a:gd name="T4" fmla="*/ 873 w 896"/>
-              <a:gd name="T5" fmla="*/ 393 h 1109"/>
-              <a:gd name="T6" fmla="*/ 407 w 896"/>
-              <a:gd name="T7" fmla="*/ 23 h 1109"/>
-              <a:gd name="T8" fmla="*/ 23 w 896"/>
-              <a:gd name="T9" fmla="*/ 479 h 1109"/>
-            </a:gdLst>
-            <a:ahLst/>
-            <a:cxnLst>
-              <a:cxn ang="0">
-                <a:pos x="T0" y="T1"/>
-              </a:cxn>
-              <a:cxn ang="0">
-                <a:pos x="T2" y="T3"/>
-              </a:cxn>
-              <a:cxn ang="0">
-                <a:pos x="T4" y="T5"/>
-              </a:cxn>
-              <a:cxn ang="0">
-                <a:pos x="T6" y="T7"/>
-              </a:cxn>
-              <a:cxn ang="0">
-                <a:pos x="T8" y="T9"/>
-              </a:cxn>
-            </a:cxnLst>
-            <a:rect l="0" t="0" r="r" b="b"/>
-            <a:pathLst>
-              <a:path w="896" h="1109">
-                <a:moveTo>
-                  <a:pt x="23" y="479"/>
-                </a:moveTo>
-                <a:cubicBezTo>
-                  <a:pt x="46" y="707"/>
-                  <a:pt x="396" y="1109"/>
-                  <a:pt x="631" y="1086"/>
-                </a:cubicBezTo>
-                <a:cubicBezTo>
-                  <a:pt x="865" y="1062"/>
-                  <a:pt x="896" y="621"/>
-                  <a:pt x="873" y="393"/>
-                </a:cubicBezTo>
-                <a:cubicBezTo>
-                  <a:pt x="850" y="165"/>
-                  <a:pt x="641" y="0"/>
-                  <a:pt x="407" y="23"/>
-                </a:cubicBezTo>
-                <a:cubicBezTo>
-                  <a:pt x="172" y="47"/>
-                  <a:pt x="0" y="251"/>
-                  <a:pt x="23" y="479"/>
-                </a:cubicBezTo>
-                <a:close/>
-              </a:path>
-            </a:pathLst>
-          </a:custGeom>
-          <a:gradFill flip="none" rotWithShape="1">
-            <a:gsLst>
-              <a:gs pos="100000">
-                <a:srgbClr val="7030A0">
-                  <a:alpha val="90000"/>
-                  <a:lumMod val="100000"/>
-                </a:srgbClr>
-              </a:gs>
-              <a:gs pos="0">
-                <a:srgbClr val="002060"/>
-              </a:gs>
-            </a:gsLst>
-            <a:path path="rect">
-              <a:fillToRect t="100000" r="100000"/>
-            </a:path>
-            <a:tileRect l="-100000" b="-100000"/>
-          </a:gradFill>
-          <a:ln>
-            <a:noFill/>
-          </a:ln>
-        </p:spPr>
-        <p:txBody>
-          <a:bodyPr vert="horz" wrap="square" lIns="91440" tIns="45720" rIns="91440" bIns="45720" numCol="1" anchor="t" anchorCtr="0" compatLnSpc="1">
-            <a:prstTxWarp prst="textNoShape">
-              <a:avLst/>
-            </a:prstTxWarp>
-          </a:bodyPr>
-          <a:lstStyle/>
-          <a:p>
-            <a:endParaRPr lang="en-US">
-              <a:latin typeface="Open Sans" panose="020B0606030504020204" pitchFamily="34" charset="0"/>
-            </a:endParaRPr>
-          </a:p>
-        </p:txBody>
-      </p:sp>
+              </a:endParaRPr>
+            </a:p>
+          </p:txBody>
+        </p:sp>
+      </p:grpSp>
     </p:spTree>
     <p:extLst>
       <p:ext uri="{BB962C8B-B14F-4D97-AF65-F5344CB8AC3E}">
         <p14:creationId xmlns:p14="http://schemas.microsoft.com/office/powerpoint/2010/main" val="2886854578"/>
+      </p:ext>
+    </p:extLst>
+  </p:cSld>
+  <p:clrMapOvr>
+    <a:masterClrMapping/>
+  </p:clrMapOvr>
+</p:sld>
+</file>
+
+<file path=ppt/slides/slide3.xml><?xml version="1.0" encoding="utf-8"?>
+<p:sld xmlns:a="http://schemas.openxmlformats.org/drawingml/2006/main" xmlns:r="http://schemas.openxmlformats.org/officeDocument/2006/relationships" xmlns:p="http://schemas.openxmlformats.org/presentationml/2006/main">
+  <p:cSld>
+    <p:bg>
+      <p:bgPr>
+        <a:solidFill>
+          <a:schemeClr val="accent1">
+            <a:lumMod val="20000"/>
+            <a:lumOff val="80000"/>
+          </a:schemeClr>
+        </a:solidFill>
+        <a:effectLst/>
+      </p:bgPr>
+    </p:bg>
+    <p:spTree>
+      <p:nvGrpSpPr>
+        <p:cNvPr id="1" name=""/>
+        <p:cNvGrpSpPr/>
+        <p:nvPr/>
+      </p:nvGrpSpPr>
+      <p:grpSpPr>
+        <a:xfrm>
+          <a:off x="0" y="0"/>
+          <a:ext cx="0" cy="0"/>
+          <a:chOff x="0" y="0"/>
+          <a:chExt cx="0" cy="0"/>
+        </a:xfrm>
+      </p:grpSpPr>
+      <p:pic>
+        <p:nvPicPr>
+          <p:cNvPr id="8" name="Picture 7" descr="A red and black square with a pie chart and text&#10;&#10;Description automatically generated">
+            <a:extLst>
+              <a:ext uri="{FF2B5EF4-FFF2-40B4-BE49-F238E27FC236}">
+                <a16:creationId xmlns:a16="http://schemas.microsoft.com/office/drawing/2014/main" id="{964AF0F4-4E84-E0E5-E4FD-B51E3E055740}"/>
+              </a:ext>
+            </a:extLst>
+          </p:cNvPr>
+          <p:cNvPicPr>
+            <a:picLocks noChangeAspect="1"/>
+          </p:cNvPicPr>
+          <p:nvPr/>
+        </p:nvPicPr>
+        <p:blipFill>
+          <a:blip r:embed="rId2">
+            <a:extLst>
+              <a:ext uri="{28A0092B-C50C-407E-A947-70E740481C1C}">
+                <a14:useLocalDpi xmlns:a14="http://schemas.microsoft.com/office/drawing/2010/main" val="0"/>
+              </a:ext>
+            </a:extLst>
+          </a:blip>
+          <a:stretch>
+            <a:fillRect/>
+          </a:stretch>
+        </p:blipFill>
+        <p:spPr>
+          <a:xfrm>
+            <a:off x="520700" y="463550"/>
+            <a:ext cx="3251200" cy="3251200"/>
+          </a:xfrm>
+          <a:prstGeom prst="rect">
+            <a:avLst/>
+          </a:prstGeom>
+        </p:spPr>
+      </p:pic>
+      <p:pic>
+        <p:nvPicPr>
+          <p:cNvPr id="12" name="Picture Placeholder 11" descr="A yellow and black background&#10;&#10;Description automatically generated">
+            <a:extLst>
+              <a:ext uri="{FF2B5EF4-FFF2-40B4-BE49-F238E27FC236}">
+                <a16:creationId xmlns:a16="http://schemas.microsoft.com/office/drawing/2014/main" id="{5C9E0B4C-67D6-34FF-C200-BD2E78A121B9}"/>
+              </a:ext>
+            </a:extLst>
+          </p:cNvPr>
+          <p:cNvPicPr>
+            <a:picLocks noGrp="1" noChangeAspect="1"/>
+          </p:cNvPicPr>
+          <p:nvPr>
+            <p:ph type="pic" sz="quarter" idx="10"/>
+          </p:nvPr>
+        </p:nvPicPr>
+        <p:blipFill>
+          <a:blip r:embed="rId3">
+            <a:extLst>
+              <a:ext uri="{28A0092B-C50C-407E-A947-70E740481C1C}">
+                <a14:useLocalDpi xmlns:a14="http://schemas.microsoft.com/office/drawing/2010/main" val="0"/>
+              </a:ext>
+            </a:extLst>
+          </a:blip>
+          <a:srcRect t="16980" b="16980"/>
+          <a:stretch>
+            <a:fillRect/>
+          </a:stretch>
+        </p:blipFill>
+        <p:spPr/>
+      </p:pic>
+    </p:spTree>
+    <p:extLst>
+      <p:ext uri="{BB962C8B-B14F-4D97-AF65-F5344CB8AC3E}">
+        <p14:creationId xmlns:p14="http://schemas.microsoft.com/office/powerpoint/2010/main" val="4119591603"/>
       </p:ext>
     </p:extLst>
   </p:cSld>

</xml_diff>